<commit_message>
Aanpassingen aan les 1
Paar commando's toegevoegd
PowerPoint net wat aangepast
</commit_message>
<xml_diff>
--- a/Les 1/Les 1.pptx
+++ b/Les 1/Les 1.pptx
@@ -5,7 +5,7 @@
     <p:sldMasterId id="2147483648" r:id="rId1"/>
   </p:sldMasterIdLst>
   <p:notesMasterIdLst>
-    <p:notesMasterId r:id="rId16"/>
+    <p:notesMasterId r:id="rId17"/>
   </p:notesMasterIdLst>
   <p:sldIdLst>
     <p:sldId id="256" r:id="rId2"/>
@@ -22,6 +22,7 @@
     <p:sldId id="267" r:id="rId13"/>
     <p:sldId id="268" r:id="rId14"/>
     <p:sldId id="269" r:id="rId15"/>
+    <p:sldId id="270" r:id="rId16"/>
   </p:sldIdLst>
   <p:sldSz cx="12192000" cy="6858000"/>
   <p:notesSz cx="6858000" cy="9144000"/>
@@ -120,6 +121,11 @@
       </a:defRPr>
     </a:lvl9pPr>
   </p:defaultTextStyle>
+  <p:extLst>
+    <p:ext uri="{EFAFB233-063F-42B5-8137-9DF3F51BA10A}">
+      <p15:sldGuideLst xmlns:p15="http://schemas.microsoft.com/office/powerpoint/2012/main"/>
+    </p:ext>
+  </p:extLst>
 </p:presentation>
 </file>
 
@@ -3196,6 +3202,90 @@
     <p:extLst>
       <p:ext uri="{BB962C8B-B14F-4D97-AF65-F5344CB8AC3E}">
         <p14:creationId xmlns:p14="http://schemas.microsoft.com/office/powerpoint/2010/main" val="868607919"/>
+      </p:ext>
+    </p:extLst>
+  </p:cSld>
+  <p:clrMapOvr>
+    <a:masterClrMapping/>
+  </p:clrMapOvr>
+</p:notes>
+</file>
+
+<file path=ppt/notesSlides/notesSlide9.xml><?xml version="1.0" encoding="utf-8"?>
+<p:notes xmlns:a="http://schemas.openxmlformats.org/drawingml/2006/main" xmlns:r="http://schemas.openxmlformats.org/officeDocument/2006/relationships" xmlns:p="http://schemas.openxmlformats.org/presentationml/2006/main">
+  <p:cSld>
+    <p:spTree>
+      <p:nvGrpSpPr>
+        <p:cNvPr id="1" name=""/>
+        <p:cNvGrpSpPr/>
+        <p:nvPr/>
+      </p:nvGrpSpPr>
+      <p:grpSpPr>
+        <a:xfrm>
+          <a:off x="0" y="0"/>
+          <a:ext cx="0" cy="0"/>
+          <a:chOff x="0" y="0"/>
+          <a:chExt cx="0" cy="0"/>
+        </a:xfrm>
+      </p:grpSpPr>
+      <p:sp>
+        <p:nvSpPr>
+          <p:cNvPr id="2" name="Slide Image Placeholder 1"/>
+          <p:cNvSpPr>
+            <a:spLocks noGrp="1" noRot="1" noChangeAspect="1"/>
+          </p:cNvSpPr>
+          <p:nvPr>
+            <p:ph type="sldImg"/>
+          </p:nvPr>
+        </p:nvSpPr>
+        <p:spPr/>
+      </p:sp>
+      <p:sp>
+        <p:nvSpPr>
+          <p:cNvPr id="3" name="Notes Placeholder 2"/>
+          <p:cNvSpPr>
+            <a:spLocks noGrp="1"/>
+          </p:cNvSpPr>
+          <p:nvPr>
+            <p:ph type="body" idx="1"/>
+          </p:nvPr>
+        </p:nvSpPr>
+        <p:spPr/>
+        <p:txBody>
+          <a:bodyPr/>
+          <a:lstStyle/>
+          <a:p>
+            <a:endParaRPr lang="en-GB" dirty="0"/>
+          </a:p>
+        </p:txBody>
+      </p:sp>
+      <p:sp>
+        <p:nvSpPr>
+          <p:cNvPr id="4" name="Slide Number Placeholder 3"/>
+          <p:cNvSpPr>
+            <a:spLocks noGrp="1"/>
+          </p:cNvSpPr>
+          <p:nvPr>
+            <p:ph type="sldNum" sz="quarter" idx="5"/>
+          </p:nvPr>
+        </p:nvSpPr>
+        <p:spPr/>
+        <p:txBody>
+          <a:bodyPr/>
+          <a:lstStyle/>
+          <a:p>
+            <a:fld id="{5FA9D65B-7E46-4B49-ACA9-A224EC8BE93F}" type="slidenum">
+              <a:rPr lang="en-GB" smtClean="0"/>
+              <a:t>14</a:t>
+            </a:fld>
+            <a:endParaRPr lang="en-GB"/>
+          </a:p>
+        </p:txBody>
+      </p:sp>
+    </p:spTree>
+    <p:extLst>
+      <p:ext uri="{BB962C8B-B14F-4D97-AF65-F5344CB8AC3E}">
+        <p14:creationId xmlns:p14="http://schemas.microsoft.com/office/powerpoint/2010/main" val="1474120154"/>
       </p:ext>
     </p:extLst>
   </p:cSld>
@@ -7124,21 +7214,16 @@
             </a:r>
             <a:r>
               <a:rPr lang="en-GB" dirty="0"/>
-              <a:t> </a:t>
-            </a:r>
-            <a:r>
-              <a:rPr lang="en-GB" dirty="0" err="1"/>
-              <a:t>os</a:t>
-            </a:r>
-            <a:r>
-              <a:rPr lang="en-GB" dirty="0"/>
-              <a:t>, maar doe maar </a:t>
+              <a:t> is, maar doe maar </a:t>
             </a:r>
             <a:r>
               <a:rPr lang="en-GB" dirty="0" err="1"/>
               <a:t>alsnog</a:t>
             </a:r>
-            <a:endParaRPr lang="en-GB" dirty="0"/>
+            <a:r>
+              <a:rPr lang="en-GB" dirty="0"/>
+              <a:t>.</a:t>
+            </a:r>
           </a:p>
         </p:txBody>
       </p:sp>
@@ -7442,41 +7527,26 @@
             <p:ph type="title"/>
           </p:nvPr>
         </p:nvSpPr>
-        <p:spPr/>
-        <p:txBody>
-          <a:bodyPr/>
-          <a:lstStyle/>
-          <a:p>
-            <a:r>
-              <a:rPr lang="en-GB" b="1" dirty="0" err="1"/>
-              <a:t>Opdrachten</a:t>
-            </a:r>
-            <a:endParaRPr lang="en-GB" b="1" dirty="0"/>
-          </a:p>
-        </p:txBody>
-      </p:sp>
-      <p:sp>
-        <p:nvSpPr>
-          <p:cNvPr id="3" name="Content Placeholder 2">
-            <a:extLst>
-              <a:ext uri="{FF2B5EF4-FFF2-40B4-BE49-F238E27FC236}">
-                <a16:creationId xmlns:a16="http://schemas.microsoft.com/office/drawing/2014/main" id="{A1261C60-8B43-4403-BEDF-BEEA3F7E5024}"/>
-              </a:ext>
-            </a:extLst>
-          </p:cNvPr>
-          <p:cNvSpPr>
-            <a:spLocks noGrp="1"/>
-          </p:cNvSpPr>
-          <p:nvPr>
-            <p:ph idx="1"/>
-          </p:nvPr>
-        </p:nvSpPr>
-        <p:spPr/>
-        <p:txBody>
-          <a:bodyPr/>
-          <a:lstStyle/>
-          <a:p>
-            <a:endParaRPr lang="en-GB" dirty="0"/>
+        <p:spPr>
+          <a:xfrm>
+            <a:off x="2065020" y="1043305"/>
+            <a:ext cx="10515600" cy="4565015"/>
+          </a:xfrm>
+        </p:spPr>
+        <p:txBody>
+          <a:bodyPr>
+            <a:normAutofit/>
+          </a:bodyPr>
+          <a:lstStyle/>
+          <a:p>
+            <a:r>
+              <a:rPr lang="en-GB" sz="16600" b="1" dirty="0" err="1"/>
+              <a:t>Vragen</a:t>
+            </a:r>
+            <a:r>
+              <a:rPr lang="en-GB" sz="16600" b="1" dirty="0"/>
+              <a:t>?</a:t>
+            </a:r>
           </a:p>
         </p:txBody>
       </p:sp>
@@ -7484,6 +7554,93 @@
     <p:extLst>
       <p:ext uri="{BB962C8B-B14F-4D97-AF65-F5344CB8AC3E}">
         <p14:creationId xmlns:p14="http://schemas.microsoft.com/office/powerpoint/2010/main" val="1327922279"/>
+      </p:ext>
+    </p:extLst>
+  </p:cSld>
+  <p:clrMapOvr>
+    <a:masterClrMapping/>
+  </p:clrMapOvr>
+</p:sld>
+</file>
+
+<file path=ppt/slides/slide15.xml><?xml version="1.0" encoding="utf-8"?>
+<p:sld xmlns:a="http://schemas.openxmlformats.org/drawingml/2006/main" xmlns:r="http://schemas.openxmlformats.org/officeDocument/2006/relationships" xmlns:p="http://schemas.openxmlformats.org/presentationml/2006/main">
+  <p:cSld>
+    <p:spTree>
+      <p:nvGrpSpPr>
+        <p:cNvPr id="1" name=""/>
+        <p:cNvGrpSpPr/>
+        <p:nvPr/>
+      </p:nvGrpSpPr>
+      <p:grpSpPr>
+        <a:xfrm>
+          <a:off x="0" y="0"/>
+          <a:ext cx="0" cy="0"/>
+          <a:chOff x="0" y="0"/>
+          <a:chExt cx="0" cy="0"/>
+        </a:xfrm>
+      </p:grpSpPr>
+      <p:sp>
+        <p:nvSpPr>
+          <p:cNvPr id="2" name="Title 1">
+            <a:extLst>
+              <a:ext uri="{FF2B5EF4-FFF2-40B4-BE49-F238E27FC236}">
+                <a16:creationId xmlns:a16="http://schemas.microsoft.com/office/drawing/2014/main" id="{DB5FBF5E-2F6E-45CE-898A-11196A8A1F40}"/>
+              </a:ext>
+            </a:extLst>
+          </p:cNvPr>
+          <p:cNvSpPr>
+            <a:spLocks noGrp="1"/>
+          </p:cNvSpPr>
+          <p:nvPr>
+            <p:ph type="title"/>
+          </p:nvPr>
+        </p:nvSpPr>
+        <p:spPr/>
+        <p:txBody>
+          <a:bodyPr/>
+          <a:lstStyle/>
+          <a:p>
+            <a:r>
+              <a:rPr lang="en-GB" b="1"/>
+              <a:t>Opdrachten</a:t>
+            </a:r>
+            <a:endParaRPr lang="en-GB" b="1" dirty="0"/>
+          </a:p>
+        </p:txBody>
+      </p:sp>
+      <p:sp>
+        <p:nvSpPr>
+          <p:cNvPr id="3" name="Content Placeholder 2">
+            <a:extLst>
+              <a:ext uri="{FF2B5EF4-FFF2-40B4-BE49-F238E27FC236}">
+                <a16:creationId xmlns:a16="http://schemas.microsoft.com/office/drawing/2014/main" id="{08D804F4-8632-46F2-BEFD-09522A72F5C8}"/>
+              </a:ext>
+            </a:extLst>
+          </p:cNvPr>
+          <p:cNvSpPr>
+            <a:spLocks noGrp="1"/>
+          </p:cNvSpPr>
+          <p:nvPr>
+            <p:ph idx="1"/>
+          </p:nvPr>
+        </p:nvSpPr>
+        <p:spPr/>
+        <p:txBody>
+          <a:bodyPr/>
+          <a:lstStyle/>
+          <a:p>
+            <a:r>
+              <a:rPr lang="en-GB" dirty="0"/>
+              <a:t>https://github.com/ralphvl/PS.Lessons/blob/main/Les%201/Vragen.ps1</a:t>
+            </a:r>
+          </a:p>
+        </p:txBody>
+      </p:sp>
+    </p:spTree>
+    <p:extLst>
+      <p:ext uri="{BB962C8B-B14F-4D97-AF65-F5344CB8AC3E}">
+        <p14:creationId xmlns:p14="http://schemas.microsoft.com/office/powerpoint/2010/main" val="2703084796"/>
       </p:ext>
     </p:extLst>
   </p:cSld>

</xml_diff>